<commit_message>
Updated the ppt to scroll.
</commit_message>
<xml_diff>
--- a/VideoHeadshotBullets.pptx
+++ b/VideoHeadshotBullets.pptx
@@ -13,6 +13,7 @@
     <p:sldId id="262" r:id="rId7"/>
     <p:sldId id="263" r:id="rId8"/>
     <p:sldId id="264" r:id="rId9"/>
+    <p:sldId id="266" r:id="rId10"/>
   </p:sldIdLst>
   <p:sldSz cx="12192000" cy="6858000"/>
   <p:notesSz cx="6858000" cy="9144000"/>
@@ -111,6 +112,11 @@
       </a:defRPr>
     </a:lvl9pPr>
   </p:defaultTextStyle>
+  <p:extLst>
+    <p:ext uri="{EFAFB233-063F-42B5-8137-9DF3F51BA10A}">
+      <p15:sldGuideLst xmlns:p15="http://schemas.microsoft.com/office/powerpoint/2012/main"/>
+    </p:ext>
+  </p:extLst>
 </p:presentation>
 </file>
 
@@ -245,7 +251,7 @@
           <a:p>
             <a:fld id="{46C2BDB5-7FB0-449D-A63D-A0F5CA34641A}" type="datetimeFigureOut">
               <a:rPr lang="en-US" smtClean="0"/>
-              <a:t>3/19/2013</a:t>
+              <a:t>3/20/2013</a:t>
             </a:fld>
             <a:endParaRPr lang="en-US"/>
           </a:p>
@@ -415,7 +421,7 @@
           <a:p>
             <a:fld id="{46C2BDB5-7FB0-449D-A63D-A0F5CA34641A}" type="datetimeFigureOut">
               <a:rPr lang="en-US" smtClean="0"/>
-              <a:t>3/19/2013</a:t>
+              <a:t>3/20/2013</a:t>
             </a:fld>
             <a:endParaRPr lang="en-US"/>
           </a:p>
@@ -595,7 +601,7 @@
           <a:p>
             <a:fld id="{46C2BDB5-7FB0-449D-A63D-A0F5CA34641A}" type="datetimeFigureOut">
               <a:rPr lang="en-US" smtClean="0"/>
-              <a:t>3/19/2013</a:t>
+              <a:t>3/20/2013</a:t>
             </a:fld>
             <a:endParaRPr lang="en-US"/>
           </a:p>
@@ -765,7 +771,7 @@
           <a:p>
             <a:fld id="{46C2BDB5-7FB0-449D-A63D-A0F5CA34641A}" type="datetimeFigureOut">
               <a:rPr lang="en-US" smtClean="0"/>
-              <a:t>3/19/2013</a:t>
+              <a:t>3/20/2013</a:t>
             </a:fld>
             <a:endParaRPr lang="en-US"/>
           </a:p>
@@ -1011,7 +1017,7 @@
           <a:p>
             <a:fld id="{46C2BDB5-7FB0-449D-A63D-A0F5CA34641A}" type="datetimeFigureOut">
               <a:rPr lang="en-US" smtClean="0"/>
-              <a:t>3/19/2013</a:t>
+              <a:t>3/20/2013</a:t>
             </a:fld>
             <a:endParaRPr lang="en-US"/>
           </a:p>
@@ -1243,7 +1249,7 @@
           <a:p>
             <a:fld id="{46C2BDB5-7FB0-449D-A63D-A0F5CA34641A}" type="datetimeFigureOut">
               <a:rPr lang="en-US" smtClean="0"/>
-              <a:t>3/19/2013</a:t>
+              <a:t>3/20/2013</a:t>
             </a:fld>
             <a:endParaRPr lang="en-US"/>
           </a:p>
@@ -1610,7 +1616,7 @@
           <a:p>
             <a:fld id="{46C2BDB5-7FB0-449D-A63D-A0F5CA34641A}" type="datetimeFigureOut">
               <a:rPr lang="en-US" smtClean="0"/>
-              <a:t>3/19/2013</a:t>
+              <a:t>3/20/2013</a:t>
             </a:fld>
             <a:endParaRPr lang="en-US"/>
           </a:p>
@@ -1728,7 +1734,7 @@
           <a:p>
             <a:fld id="{46C2BDB5-7FB0-449D-A63D-A0F5CA34641A}" type="datetimeFigureOut">
               <a:rPr lang="en-US" smtClean="0"/>
-              <a:t>3/19/2013</a:t>
+              <a:t>3/20/2013</a:t>
             </a:fld>
             <a:endParaRPr lang="en-US"/>
           </a:p>
@@ -1823,7 +1829,7 @@
           <a:p>
             <a:fld id="{46C2BDB5-7FB0-449D-A63D-A0F5CA34641A}" type="datetimeFigureOut">
               <a:rPr lang="en-US" smtClean="0"/>
-              <a:t>3/19/2013</a:t>
+              <a:t>3/20/2013</a:t>
             </a:fld>
             <a:endParaRPr lang="en-US"/>
           </a:p>
@@ -2100,7 +2106,7 @@
           <a:p>
             <a:fld id="{46C2BDB5-7FB0-449D-A63D-A0F5CA34641A}" type="datetimeFigureOut">
               <a:rPr lang="en-US" smtClean="0"/>
-              <a:t>3/19/2013</a:t>
+              <a:t>3/20/2013</a:t>
             </a:fld>
             <a:endParaRPr lang="en-US"/>
           </a:p>
@@ -2353,7 +2359,7 @@
           <a:p>
             <a:fld id="{46C2BDB5-7FB0-449D-A63D-A0F5CA34641A}" type="datetimeFigureOut">
               <a:rPr lang="en-US" smtClean="0"/>
-              <a:t>3/19/2013</a:t>
+              <a:t>3/20/2013</a:t>
             </a:fld>
             <a:endParaRPr lang="en-US"/>
           </a:p>
@@ -2566,7 +2572,7 @@
           <a:p>
             <a:fld id="{46C2BDB5-7FB0-449D-A63D-A0F5CA34641A}" type="datetimeFigureOut">
               <a:rPr lang="en-US" smtClean="0"/>
-              <a:t>3/19/2013</a:t>
+              <a:t>3/20/2013</a:t>
             </a:fld>
             <a:endParaRPr lang="en-US"/>
           </a:p>
@@ -3866,6 +3872,508 @@
 </p:sld>
 </file>
 
+<file path=ppt/slides/slide9.xml><?xml version="1.0" encoding="utf-8"?>
+<p:sld xmlns:a="http://schemas.openxmlformats.org/drawingml/2006/main" xmlns:r="http://schemas.openxmlformats.org/officeDocument/2006/relationships" xmlns:p="http://schemas.openxmlformats.org/presentationml/2006/main">
+  <p:cSld>
+    <p:spTree>
+      <p:nvGrpSpPr>
+        <p:cNvPr id="1" name=""/>
+        <p:cNvGrpSpPr/>
+        <p:nvPr/>
+      </p:nvGrpSpPr>
+      <p:grpSpPr>
+        <a:xfrm>
+          <a:off x="0" y="0"/>
+          <a:ext cx="0" cy="0"/>
+          <a:chOff x="0" y="0"/>
+          <a:chExt cx="0" cy="0"/>
+        </a:xfrm>
+      </p:grpSpPr>
+      <p:sp>
+        <p:nvSpPr>
+          <p:cNvPr id="3" name="Content Placeholder 2"/>
+          <p:cNvSpPr>
+            <a:spLocks noGrp="1"/>
+          </p:cNvSpPr>
+          <p:nvPr>
+            <p:ph idx="1"/>
+          </p:nvPr>
+        </p:nvSpPr>
+        <p:spPr>
+          <a:xfrm>
+            <a:off x="235974" y="108154"/>
+            <a:ext cx="11877368" cy="6656439"/>
+          </a:xfrm>
+        </p:spPr>
+        <p:txBody>
+          <a:bodyPr>
+            <a:noAutofit/>
+          </a:bodyPr>
+          <a:lstStyle/>
+          <a:p>
+            <a:pPr marL="0" indent="0">
+              <a:buNone/>
+            </a:pPr>
+            <a:r>
+              <a:rPr lang="en-US" dirty="0"/>
+              <a:t>Hello I am </a:t>
+            </a:r>
+            <a:r>
+              <a:rPr lang="en-US" dirty="0" smtClean="0"/>
+              <a:t>Derik Whittaker </a:t>
+            </a:r>
+            <a:r>
+              <a:rPr lang="en-US" dirty="0"/>
+              <a:t>and I am going to be your instructor for this live </a:t>
+            </a:r>
+            <a:r>
+              <a:rPr lang="en-US" dirty="0" smtClean="0"/>
+              <a:t>lesson.                                                                                                                                  {--------------------------------------------------------------------------------------------------------} I </a:t>
+            </a:r>
+            <a:r>
+              <a:rPr lang="en-US" dirty="0"/>
+              <a:t>have been building </a:t>
+            </a:r>
+            <a:r>
+              <a:rPr lang="en-US" dirty="0" err="1"/>
+              <a:t>.net</a:t>
+            </a:r>
+            <a:r>
+              <a:rPr lang="en-US" dirty="0"/>
+              <a:t> based applications for last 12 years.  </a:t>
+            </a:r>
+            <a:r>
+              <a:rPr lang="en-US" dirty="0" smtClean="0"/>
+              <a:t>Over </a:t>
+            </a:r>
+            <a:r>
+              <a:rPr lang="en-US" dirty="0"/>
+              <a:t>this time I </a:t>
+            </a:r>
+            <a:r>
+              <a:rPr lang="en-US" dirty="0" smtClean="0"/>
+              <a:t>have build </a:t>
+            </a:r>
+            <a:r>
+              <a:rPr lang="en-US" dirty="0"/>
+              <a:t>client server applications, </a:t>
+            </a:r>
+            <a:r>
+              <a:rPr lang="en-US" dirty="0" smtClean="0"/>
+              <a:t>browser </a:t>
+            </a:r>
+            <a:r>
+              <a:rPr lang="en-US" dirty="0"/>
+              <a:t>based applications as well as mobile </a:t>
+            </a:r>
+            <a:r>
+              <a:rPr lang="en-US" dirty="0" smtClean="0"/>
+              <a:t>applications.                                                                                                                         {--------------------------------------------------------------------------------------------------------}                                                                                                      I </a:t>
+            </a:r>
+            <a:r>
+              <a:rPr lang="en-US" dirty="0"/>
+              <a:t>am a C# MVP, a member of the ASP Insiders group and a frequent speaker at various </a:t>
+            </a:r>
+            <a:r>
+              <a:rPr lang="en-US" dirty="0" smtClean="0"/>
+              <a:t>user groups </a:t>
+            </a:r>
+            <a:r>
+              <a:rPr lang="en-US" dirty="0"/>
+              <a:t>and </a:t>
+            </a:r>
+            <a:r>
+              <a:rPr lang="en-US" dirty="0" smtClean="0"/>
+              <a:t>developer </a:t>
+            </a:r>
+            <a:r>
+              <a:rPr lang="en-US" dirty="0"/>
+              <a:t>conferences around the country</a:t>
+            </a:r>
+            <a:r>
+              <a:rPr lang="en-US" dirty="0" smtClean="0"/>
+              <a:t>.                      {--------------------------------------------------------------------------------------------------------}  IN </a:t>
+            </a:r>
+            <a:r>
+              <a:rPr lang="en-US" dirty="0"/>
+              <a:t>this live lesson we are going to dive into the world of building Windows 8 Modern UI </a:t>
+            </a:r>
+            <a:r>
+              <a:rPr lang="en-US" dirty="0" smtClean="0"/>
+              <a:t>applications with </a:t>
+            </a:r>
+            <a:r>
+              <a:rPr lang="en-US" dirty="0"/>
+              <a:t>C# and XAML. I will assume you have a working knowledge of both C# as well as XAML, but we </a:t>
+            </a:r>
+            <a:r>
+              <a:rPr lang="en-US" dirty="0" smtClean="0"/>
+              <a:t>still </a:t>
+            </a:r>
+            <a:r>
+              <a:rPr lang="en-US" dirty="0"/>
+              <a:t>cover many of the basic skills needed to build a modern UI application</a:t>
+            </a:r>
+            <a:r>
+              <a:rPr lang="en-US" dirty="0" smtClean="0"/>
+              <a:t>.</a:t>
+            </a:r>
+            <a:r>
+              <a:rPr lang="en-US" dirty="0"/>
+              <a:t> </a:t>
+            </a:r>
+            <a:r>
+              <a:rPr lang="en-US" dirty="0" smtClean="0"/>
+              <a:t>                                                                    {--------------------------------------------------------------------------------------------------------} In </a:t>
+            </a:r>
+            <a:r>
+              <a:rPr lang="en-US" dirty="0"/>
+              <a:t>order to build a Windows 8 Modern UI application you will need to have a computer </a:t>
+            </a:r>
+            <a:r>
+              <a:rPr lang="en-US" dirty="0" smtClean="0"/>
+              <a:t>running windows </a:t>
+            </a:r>
+            <a:r>
+              <a:rPr lang="en-US" dirty="0"/>
+              <a:t>8 as well as Visual Studio </a:t>
+            </a:r>
+            <a:r>
+              <a:rPr lang="en-US" dirty="0" smtClean="0"/>
+              <a:t>2012                                           {--------------------------------------------------------------------------------------------------------}</a:t>
+            </a:r>
+            <a:r>
+              <a:rPr lang="en-US" dirty="0"/>
+              <a:t> {--------------------------------------------------------------------------------------------------------}</a:t>
+            </a:r>
+            <a:r>
+              <a:rPr lang="en-US" dirty="0" smtClean="0"/>
+              <a:t> Lets </a:t>
+            </a:r>
+            <a:r>
+              <a:rPr lang="en-US" dirty="0"/>
+              <a:t>go ahead and talk about the content of our </a:t>
+            </a:r>
+            <a:r>
+              <a:rPr lang="en-US" dirty="0" smtClean="0"/>
+              <a:t>lessons                                           {--------------------------------------------------------------------------------------------------------} {--------------------------------------------------------------------------------------------------------} In </a:t>
+            </a:r>
+            <a:r>
+              <a:rPr lang="en-US" dirty="0"/>
+              <a:t>the first lesson we are going to take lap around Win8 and Visual </a:t>
+            </a:r>
+            <a:r>
+              <a:rPr lang="en-US" dirty="0" smtClean="0"/>
+              <a:t>studio </a:t>
+            </a:r>
+            <a:r>
+              <a:rPr lang="en-US" dirty="0"/>
+              <a:t>2012 in order to </a:t>
+            </a:r>
+            <a:r>
+              <a:rPr lang="en-US" dirty="0" smtClean="0"/>
+              <a:t>familiarize ourselves with </a:t>
+            </a:r>
+            <a:r>
+              <a:rPr lang="en-US" dirty="0"/>
+              <a:t>some of the many new features we will be covering during this </a:t>
+            </a:r>
+            <a:r>
+              <a:rPr lang="en-US" dirty="0" smtClean="0"/>
+              <a:t>lesson.</a:t>
+            </a:r>
+            <a:r>
+              <a:rPr lang="en-US" dirty="0"/>
+              <a:t>  </a:t>
+            </a:r>
+            <a:r>
+              <a:rPr lang="en-US" dirty="0" smtClean="0"/>
+              <a:t>                                                                                              {--------------------------------------------------------------------------------------------------------} In </a:t>
+            </a:r>
+            <a:r>
+              <a:rPr lang="en-US" dirty="0"/>
+              <a:t>lesson 2 we will focus on leaning how to use the  Model view </a:t>
+            </a:r>
+            <a:r>
+              <a:rPr lang="en-US" dirty="0" err="1"/>
+              <a:t>view</a:t>
+            </a:r>
+            <a:r>
+              <a:rPr lang="en-US" dirty="0"/>
+              <a:t> model pattern, or MVVM, to </a:t>
+            </a:r>
+            <a:r>
+              <a:rPr lang="en-US" dirty="0" smtClean="0"/>
+              <a:t>build </a:t>
+            </a:r>
+            <a:r>
+              <a:rPr lang="en-US" dirty="0"/>
+              <a:t>Modern UI </a:t>
+            </a:r>
+            <a:r>
+              <a:rPr lang="en-US" dirty="0" smtClean="0"/>
+              <a:t>applications</a:t>
+            </a:r>
+            <a:r>
+              <a:rPr lang="en-US" dirty="0"/>
+              <a:t> </a:t>
+            </a:r>
+            <a:r>
+              <a:rPr lang="en-US" dirty="0" smtClean="0"/>
+              <a:t>                                                  {--------------------------------------------------------------------------------------------------------} In lesson 3 we will explore 4 general features that all Modern UI developers should be </a:t>
+            </a:r>
+            <a:r>
+              <a:rPr lang="en-US" dirty="0" err="1" smtClean="0"/>
+              <a:t>familiure</a:t>
+            </a:r>
+            <a:r>
+              <a:rPr lang="en-US" dirty="0" smtClean="0"/>
+              <a:t> with, such as how to handle navigation and use the application bar .</a:t>
+            </a:r>
+            <a:r>
+              <a:rPr lang="en-US" dirty="0"/>
+              <a:t> </a:t>
+            </a:r>
+            <a:r>
+              <a:rPr lang="en-US" dirty="0" smtClean="0"/>
+              <a:t>                                                                                                                 {--------------------------------------------------------------------------------------------------------} In </a:t>
+            </a:r>
+            <a:r>
+              <a:rPr lang="en-US" dirty="0"/>
+              <a:t>lesson 4 we will explore how to use some of the common UI controls such as the grid view, list view and flip </a:t>
+            </a:r>
+            <a:r>
+              <a:rPr lang="en-US" dirty="0" smtClean="0"/>
+              <a:t>view.</a:t>
+            </a:r>
+            <a:r>
+              <a:rPr lang="en-US" dirty="0"/>
+              <a:t> </a:t>
+            </a:r>
+            <a:r>
+              <a:rPr lang="en-US" dirty="0" smtClean="0"/>
+              <a:t>                                                                             {--------------------------------------------------------------------------------------------------------} In </a:t>
+            </a:r>
+            <a:r>
+              <a:rPr lang="en-US" dirty="0"/>
+              <a:t>lesson 5 we will learn how to light up your application by learning to use the various contracts </a:t>
+            </a:r>
+            <a:r>
+              <a:rPr lang="en-US" dirty="0" smtClean="0"/>
+              <a:t>to integrate </a:t>
+            </a:r>
+            <a:r>
+              <a:rPr lang="en-US" dirty="0"/>
+              <a:t>your application into windows </a:t>
+            </a:r>
+            <a:r>
+              <a:rPr lang="en-US" dirty="0" smtClean="0"/>
+              <a:t>8</a:t>
+            </a:r>
+            <a:r>
+              <a:rPr lang="en-US" dirty="0"/>
+              <a:t> </a:t>
+            </a:r>
+            <a:r>
+              <a:rPr lang="en-US" dirty="0" smtClean="0"/>
+              <a:t>                               {--------------------------------------------------------------------------------------------------------} In </a:t>
+            </a:r>
+            <a:r>
+              <a:rPr lang="en-US" dirty="0"/>
+              <a:t>lesson 6 we will learn how to light up </a:t>
+            </a:r>
+            <a:r>
+              <a:rPr lang="en-US" dirty="0" smtClean="0"/>
+              <a:t>our start </a:t>
+            </a:r>
+            <a:r>
+              <a:rPr lang="en-US" dirty="0"/>
+              <a:t>screen </a:t>
+            </a:r>
+            <a:r>
+              <a:rPr lang="en-US" dirty="0" smtClean="0"/>
+              <a:t>by understanding how live tiles work and how they can command the attention of your users</a:t>
+            </a:r>
+            <a:r>
+              <a:rPr lang="en-US" dirty="0"/>
+              <a:t> </a:t>
+            </a:r>
+            <a:r>
+              <a:rPr lang="en-US" dirty="0" smtClean="0"/>
+              <a:t>                 {--------------------------------------------------------------------------------------------------------} In </a:t>
+            </a:r>
+            <a:r>
+              <a:rPr lang="en-US" dirty="0"/>
+              <a:t>lesson 7 we will explore how to handle transitions and animations in your </a:t>
+            </a:r>
+            <a:r>
+              <a:rPr lang="en-US" dirty="0" smtClean="0"/>
+              <a:t>Modern UI application.</a:t>
+            </a:r>
+            <a:r>
+              <a:rPr lang="en-US" dirty="0"/>
+              <a:t> </a:t>
+            </a:r>
+            <a:r>
+              <a:rPr lang="en-US" dirty="0" smtClean="0"/>
+              <a:t>                                                                                                    {--------------------------------------------------------------------------------------------------------} In </a:t>
+            </a:r>
+            <a:r>
+              <a:rPr lang="en-US" dirty="0"/>
+              <a:t>lesson 8 we will learn how to use many of the built device sensors which will be </a:t>
+            </a:r>
+            <a:r>
+              <a:rPr lang="en-US" dirty="0" smtClean="0"/>
+              <a:t>available </a:t>
+            </a:r>
+            <a:r>
+              <a:rPr lang="en-US" dirty="0"/>
+              <a:t>to you </a:t>
+            </a:r>
+            <a:r>
+              <a:rPr lang="en-US" dirty="0" smtClean="0"/>
+              <a:t>when </a:t>
+            </a:r>
+            <a:r>
+              <a:rPr lang="en-US" dirty="0"/>
+              <a:t>building </a:t>
+            </a:r>
+            <a:r>
+              <a:rPr lang="en-US" dirty="0" smtClean="0"/>
+              <a:t>Modern UI </a:t>
+            </a:r>
+            <a:r>
+              <a:rPr lang="en-US" dirty="0"/>
+              <a:t>apps.  These include the camera, light sensor and accelerometer to name a </a:t>
+            </a:r>
+            <a:r>
+              <a:rPr lang="en-US" dirty="0" smtClean="0"/>
+              <a:t>few.</a:t>
+            </a:r>
+            <a:r>
+              <a:rPr lang="en-US" dirty="0"/>
+              <a:t> </a:t>
+            </a:r>
+            <a:r>
+              <a:rPr lang="en-US" dirty="0" smtClean="0"/>
+              <a:t>                                                           {--------------------------------------------------------------------------------------------------------}</a:t>
+            </a:r>
+            <a:r>
+              <a:rPr lang="en-US" dirty="0"/>
+              <a:t> </a:t>
+            </a:r>
+            <a:r>
+              <a:rPr lang="en-US" dirty="0" smtClean="0"/>
+              <a:t>{--------------------------------------------------------------------------------------------------------} Now </a:t>
+            </a:r>
+            <a:r>
+              <a:rPr lang="en-US" dirty="0"/>
+              <a:t>that we know what we are going to be </a:t>
+            </a:r>
+            <a:r>
+              <a:rPr lang="en-US" dirty="0" smtClean="0"/>
+              <a:t>learning </a:t>
+            </a:r>
+            <a:r>
+              <a:rPr lang="en-US" dirty="0"/>
+              <a:t>during this lesson, its time to get to it.</a:t>
+            </a:r>
+          </a:p>
+        </p:txBody>
+      </p:sp>
+    </p:spTree>
+    <p:extLst>
+      <p:ext uri="{BB962C8B-B14F-4D97-AF65-F5344CB8AC3E}">
+        <p14:creationId xmlns:p14="http://schemas.microsoft.com/office/powerpoint/2010/main" val="1187772167"/>
+      </p:ext>
+    </p:extLst>
+  </p:cSld>
+  <p:clrMapOvr>
+    <a:masterClrMapping/>
+  </p:clrMapOvr>
+  <p:timing>
+    <p:tnLst>
+      <p:par>
+        <p:cTn id="1" dur="indefinite" restart="never" nodeType="tmRoot">
+          <p:childTnLst>
+            <p:seq concurrent="1" nextAc="seek">
+              <p:cTn id="2" dur="indefinite" nodeType="mainSeq">
+                <p:childTnLst>
+                  <p:par>
+                    <p:cTn id="3" fill="hold">
+                      <p:stCondLst>
+                        <p:cond delay="indefinite"/>
+                        <p:cond evt="onBegin" delay="0">
+                          <p:tn val="2"/>
+                        </p:cond>
+                      </p:stCondLst>
+                      <p:childTnLst>
+                        <p:par>
+                          <p:cTn id="4" fill="hold">
+                            <p:stCondLst>
+                              <p:cond delay="0"/>
+                            </p:stCondLst>
+                            <p:childTnLst>
+                              <p:par>
+                                <p:cTn id="5" presetID="64" presetClass="path" presetSubtype="0" fill="hold" grpId="0" nodeType="withEffect">
+                                  <p:stCondLst>
+                                    <p:cond delay="10000"/>
+                                  </p:stCondLst>
+                                  <p:childTnLst>
+                                    <p:animMotion origin="layout" path="M -0.00834 0.04445 L -0.0086 -5.27106 " pathEditMode="relative" rAng="0" ptsTypes="AA">
+                                      <p:cBhvr>
+                                        <p:cTn id="6" dur="240000" fill="hold"/>
+                                        <p:tgtEl>
+                                          <p:spTgt spid="3">
+                                            <p:txEl>
+                                              <p:pRg st="0" end="0"/>
+                                            </p:txEl>
+                                          </p:spTgt>
+                                        </p:tgtEl>
+                                        <p:attrNameLst>
+                                          <p:attrName>ppt_x</p:attrName>
+                                          <p:attrName>ppt_y</p:attrName>
+                                        </p:attrNameLst>
+                                      </p:cBhvr>
+                                      <p:rCtr x="-13" y="-265764"/>
+                                    </p:animMotion>
+                                  </p:childTnLst>
+                                </p:cTn>
+                              </p:par>
+                            </p:childTnLst>
+                          </p:cTn>
+                        </p:par>
+                      </p:childTnLst>
+                    </p:cTn>
+                  </p:par>
+                </p:childTnLst>
+              </p:cTn>
+              <p:prevCondLst>
+                <p:cond evt="onPrev" delay="0">
+                  <p:tgtEl>
+                    <p:sldTgt/>
+                  </p:tgtEl>
+                </p:cond>
+              </p:prevCondLst>
+              <p:nextCondLst>
+                <p:cond evt="onNext" delay="0">
+                  <p:tgtEl>
+                    <p:sldTgt/>
+                  </p:tgtEl>
+                </p:cond>
+              </p:nextCondLst>
+            </p:seq>
+          </p:childTnLst>
+        </p:cTn>
+      </p:par>
+    </p:tnLst>
+    <p:bldLst>
+      <p:bldP spid="3" grpId="0" uiExpand="1" build="p"/>
+    </p:bldLst>
+  </p:timing>
+</p:sld>
+</file>
+
 <file path=ppt/theme/theme1.xml><?xml version="1.0" encoding="utf-8"?>
 <a:theme xmlns:a="http://schemas.openxmlformats.org/drawingml/2006/main" name="Office Theme">
   <a:themeElements>

</xml_diff>